<commit_message>
juntei criação de inputs dinamicamente
</commit_message>
<xml_diff>
--- a/Método de Hondt.pptx
+++ b/Método de Hondt.pptx
@@ -7,6 +7,7 @@
   <p:sldIdLst>
     <p:sldId id="256" r:id="rId2"/>
     <p:sldId id="257" r:id="rId3"/>
+    <p:sldId id="258" r:id="rId4"/>
   </p:sldIdLst>
   <p:sldSz cx="9144000" cy="6858000" type="screen4x3"/>
   <p:notesSz cx="6858000" cy="9144000"/>
@@ -289,6 +290,7 @@
           <a:p>
             <a:fld id="{D99A0C2D-3405-4DC3-A3EF-3CA514CA7FF2}" type="datetimeFigureOut">
               <a:rPr lang="pt-PT" smtClean="0"/>
+              <a:pPr/>
               <a:t>03-02-2022</a:t>
             </a:fld>
             <a:endParaRPr lang="pt-PT"/>
@@ -331,6 +333,7 @@
           <a:p>
             <a:fld id="{4EB017A0-2FF5-4C8F-903A-700FA2894A2B}" type="slidenum">
               <a:rPr lang="pt-PT" smtClean="0"/>
+              <a:pPr/>
               <a:t>‹nº›</a:t>
             </a:fld>
             <a:endParaRPr lang="pt-PT"/>
@@ -454,6 +457,7 @@
           <a:p>
             <a:fld id="{D99A0C2D-3405-4DC3-A3EF-3CA514CA7FF2}" type="datetimeFigureOut">
               <a:rPr lang="pt-PT" smtClean="0"/>
+              <a:pPr/>
               <a:t>03-02-2022</a:t>
             </a:fld>
             <a:endParaRPr lang="pt-PT"/>
@@ -496,6 +500,7 @@
           <a:p>
             <a:fld id="{4EB017A0-2FF5-4C8F-903A-700FA2894A2B}" type="slidenum">
               <a:rPr lang="pt-PT" smtClean="0"/>
+              <a:pPr/>
               <a:t>‹nº›</a:t>
             </a:fld>
             <a:endParaRPr lang="pt-PT"/>
@@ -629,6 +634,7 @@
           <a:p>
             <a:fld id="{D99A0C2D-3405-4DC3-A3EF-3CA514CA7FF2}" type="datetimeFigureOut">
               <a:rPr lang="pt-PT" smtClean="0"/>
+              <a:pPr/>
               <a:t>03-02-2022</a:t>
             </a:fld>
             <a:endParaRPr lang="pt-PT"/>
@@ -671,6 +677,7 @@
           <a:p>
             <a:fld id="{4EB017A0-2FF5-4C8F-903A-700FA2894A2B}" type="slidenum">
               <a:rPr lang="pt-PT" smtClean="0"/>
+              <a:pPr/>
               <a:t>‹nº›</a:t>
             </a:fld>
             <a:endParaRPr lang="pt-PT"/>
@@ -794,6 +801,7 @@
           <a:p>
             <a:fld id="{D99A0C2D-3405-4DC3-A3EF-3CA514CA7FF2}" type="datetimeFigureOut">
               <a:rPr lang="pt-PT" smtClean="0"/>
+              <a:pPr/>
               <a:t>03-02-2022</a:t>
             </a:fld>
             <a:endParaRPr lang="pt-PT"/>
@@ -836,6 +844,7 @@
           <a:p>
             <a:fld id="{4EB017A0-2FF5-4C8F-903A-700FA2894A2B}" type="slidenum">
               <a:rPr lang="pt-PT" smtClean="0"/>
+              <a:pPr/>
               <a:t>‹nº›</a:t>
             </a:fld>
             <a:endParaRPr lang="pt-PT"/>
@@ -1035,6 +1044,7 @@
           <a:p>
             <a:fld id="{D99A0C2D-3405-4DC3-A3EF-3CA514CA7FF2}" type="datetimeFigureOut">
               <a:rPr lang="pt-PT" smtClean="0"/>
+              <a:pPr/>
               <a:t>03-02-2022</a:t>
             </a:fld>
             <a:endParaRPr lang="pt-PT"/>
@@ -1077,6 +1087,7 @@
           <a:p>
             <a:fld id="{4EB017A0-2FF5-4C8F-903A-700FA2894A2B}" type="slidenum">
               <a:rPr lang="pt-PT" smtClean="0"/>
+              <a:pPr/>
               <a:t>‹nº›</a:t>
             </a:fld>
             <a:endParaRPr lang="pt-PT"/>
@@ -1318,6 +1329,7 @@
           <a:p>
             <a:fld id="{D99A0C2D-3405-4DC3-A3EF-3CA514CA7FF2}" type="datetimeFigureOut">
               <a:rPr lang="pt-PT" smtClean="0"/>
+              <a:pPr/>
               <a:t>03-02-2022</a:t>
             </a:fld>
             <a:endParaRPr lang="pt-PT"/>
@@ -1360,6 +1372,7 @@
           <a:p>
             <a:fld id="{4EB017A0-2FF5-4C8F-903A-700FA2894A2B}" type="slidenum">
               <a:rPr lang="pt-PT" smtClean="0"/>
+              <a:pPr/>
               <a:t>‹nº›</a:t>
             </a:fld>
             <a:endParaRPr lang="pt-PT"/>
@@ -1735,6 +1748,7 @@
           <a:p>
             <a:fld id="{D99A0C2D-3405-4DC3-A3EF-3CA514CA7FF2}" type="datetimeFigureOut">
               <a:rPr lang="pt-PT" smtClean="0"/>
+              <a:pPr/>
               <a:t>03-02-2022</a:t>
             </a:fld>
             <a:endParaRPr lang="pt-PT"/>
@@ -1777,6 +1791,7 @@
           <a:p>
             <a:fld id="{4EB017A0-2FF5-4C8F-903A-700FA2894A2B}" type="slidenum">
               <a:rPr lang="pt-PT" smtClean="0"/>
+              <a:pPr/>
               <a:t>‹nº›</a:t>
             </a:fld>
             <a:endParaRPr lang="pt-PT"/>
@@ -1848,6 +1863,7 @@
           <a:p>
             <a:fld id="{D99A0C2D-3405-4DC3-A3EF-3CA514CA7FF2}" type="datetimeFigureOut">
               <a:rPr lang="pt-PT" smtClean="0"/>
+              <a:pPr/>
               <a:t>03-02-2022</a:t>
             </a:fld>
             <a:endParaRPr lang="pt-PT"/>
@@ -1890,6 +1906,7 @@
           <a:p>
             <a:fld id="{4EB017A0-2FF5-4C8F-903A-700FA2894A2B}" type="slidenum">
               <a:rPr lang="pt-PT" smtClean="0"/>
+              <a:pPr/>
               <a:t>‹nº›</a:t>
             </a:fld>
             <a:endParaRPr lang="pt-PT"/>
@@ -1938,6 +1955,7 @@
           <a:p>
             <a:fld id="{D99A0C2D-3405-4DC3-A3EF-3CA514CA7FF2}" type="datetimeFigureOut">
               <a:rPr lang="pt-PT" smtClean="0"/>
+              <a:pPr/>
               <a:t>03-02-2022</a:t>
             </a:fld>
             <a:endParaRPr lang="pt-PT"/>
@@ -1980,6 +1998,7 @@
           <a:p>
             <a:fld id="{4EB017A0-2FF5-4C8F-903A-700FA2894A2B}" type="slidenum">
               <a:rPr lang="pt-PT" smtClean="0"/>
+              <a:pPr/>
               <a:t>‹nº›</a:t>
             </a:fld>
             <a:endParaRPr lang="pt-PT"/>
@@ -2210,6 +2229,7 @@
           <a:p>
             <a:fld id="{D99A0C2D-3405-4DC3-A3EF-3CA514CA7FF2}" type="datetimeFigureOut">
               <a:rPr lang="pt-PT" smtClean="0"/>
+              <a:pPr/>
               <a:t>03-02-2022</a:t>
             </a:fld>
             <a:endParaRPr lang="pt-PT"/>
@@ -2252,6 +2272,7 @@
           <a:p>
             <a:fld id="{4EB017A0-2FF5-4C8F-903A-700FA2894A2B}" type="slidenum">
               <a:rPr lang="pt-PT" smtClean="0"/>
+              <a:pPr/>
               <a:t>‹nº›</a:t>
             </a:fld>
             <a:endParaRPr lang="pt-PT"/>
@@ -2458,6 +2479,7 @@
           <a:p>
             <a:fld id="{D99A0C2D-3405-4DC3-A3EF-3CA514CA7FF2}" type="datetimeFigureOut">
               <a:rPr lang="pt-PT" smtClean="0"/>
+              <a:pPr/>
               <a:t>03-02-2022</a:t>
             </a:fld>
             <a:endParaRPr lang="pt-PT"/>
@@ -2500,6 +2522,7 @@
           <a:p>
             <a:fld id="{4EB017A0-2FF5-4C8F-903A-700FA2894A2B}" type="slidenum">
               <a:rPr lang="pt-PT" smtClean="0"/>
+              <a:pPr/>
               <a:t>‹nº›</a:t>
             </a:fld>
             <a:endParaRPr lang="pt-PT"/>
@@ -2666,6 +2689,7 @@
           <a:p>
             <a:fld id="{D99A0C2D-3405-4DC3-A3EF-3CA514CA7FF2}" type="datetimeFigureOut">
               <a:rPr lang="pt-PT" smtClean="0"/>
+              <a:pPr/>
               <a:t>03-02-2022</a:t>
             </a:fld>
             <a:endParaRPr lang="pt-PT"/>
@@ -2744,6 +2768,7 @@
           <a:p>
             <a:fld id="{4EB017A0-2FF5-4C8F-903A-700FA2894A2B}" type="slidenum">
               <a:rPr lang="pt-PT" smtClean="0"/>
+              <a:pPr/>
               <a:t>‹nº›</a:t>
             </a:fld>
             <a:endParaRPr lang="pt-PT"/>
@@ -3203,6 +3228,69 @@
           <a:noFill/>
         </p:spPr>
       </p:pic>
+    </p:spTree>
+  </p:cSld>
+  <p:clrMapOvr>
+    <a:masterClrMapping/>
+  </p:clrMapOvr>
+</p:sld>
+</file>
+
+<file path=ppt/slides/slide3.xml><?xml version="1.0" encoding="utf-8"?>
+<p:sld xmlns:a="http://schemas.openxmlformats.org/drawingml/2006/main" xmlns:r="http://schemas.openxmlformats.org/officeDocument/2006/relationships" xmlns:p="http://schemas.openxmlformats.org/presentationml/2006/main">
+  <p:cSld>
+    <p:spTree>
+      <p:nvGrpSpPr>
+        <p:cNvPr id="1" name=""/>
+        <p:cNvGrpSpPr/>
+        <p:nvPr/>
+      </p:nvGrpSpPr>
+      <p:grpSpPr>
+        <a:xfrm>
+          <a:off x="0" y="0"/>
+          <a:ext cx="0" cy="0"/>
+          <a:chOff x="0" y="0"/>
+          <a:chExt cx="0" cy="0"/>
+        </a:xfrm>
+      </p:grpSpPr>
+      <p:sp>
+        <p:nvSpPr>
+          <p:cNvPr id="2" name="Título 1"/>
+          <p:cNvSpPr>
+            <a:spLocks noGrp="1"/>
+          </p:cNvSpPr>
+          <p:nvPr>
+            <p:ph type="title"/>
+          </p:nvPr>
+        </p:nvSpPr>
+        <p:spPr/>
+        <p:txBody>
+          <a:bodyPr/>
+          <a:lstStyle/>
+          <a:p>
+            <a:endParaRPr lang="pt-PT"/>
+          </a:p>
+        </p:txBody>
+      </p:sp>
+      <p:sp>
+        <p:nvSpPr>
+          <p:cNvPr id="3" name="Marcador de Posição de Conteúdo 2"/>
+          <p:cNvSpPr>
+            <a:spLocks noGrp="1"/>
+          </p:cNvSpPr>
+          <p:nvPr>
+            <p:ph idx="1"/>
+          </p:nvPr>
+        </p:nvSpPr>
+        <p:spPr/>
+        <p:txBody>
+          <a:bodyPr/>
+          <a:lstStyle/>
+          <a:p>
+            <a:endParaRPr lang="pt-PT"/>
+          </a:p>
+        </p:txBody>
+      </p:sp>
     </p:spTree>
   </p:cSld>
   <p:clrMapOvr>

</xml_diff>